<commit_message>
feat: add new code for module 5
</commit_message>
<xml_diff>
--- a/Unidad_5/Presentación.pptx
+++ b/Unidad_5/Presentación.pptx
@@ -5,15 +5,13 @@
     <p:sldMasterId id="2147483648" r:id="rId4"/>
   </p:sldMasterIdLst>
   <p:notesMasterIdLst>
-    <p:notesMasterId r:id="rId11"/>
+    <p:notesMasterId r:id="rId9"/>
   </p:notesMasterIdLst>
   <p:sldIdLst>
     <p:sldId id="256" r:id="rId5"/>
     <p:sldId id="257" r:id="rId6"/>
-    <p:sldId id="258" r:id="rId7"/>
-    <p:sldId id="259" r:id="rId8"/>
-    <p:sldId id="260" r:id="rId9"/>
-    <p:sldId id="261" r:id="rId10"/>
+    <p:sldId id="262" r:id="rId7"/>
+    <p:sldId id="263" r:id="rId8"/>
   </p:sldIdLst>
   <p:sldSz cx="12192000" cy="6858000"/>
   <p:notesSz cx="6858000" cy="9144000"/>
@@ -3897,8 +3895,12 @@
           <a:lstStyle/>
           <a:p>
             <a:r>
+              <a:rPr lang="en-US" dirty="0" err="1"/>
+              <a:t>Módulo</a:t>
+            </a:r>
+            <a:r>
               <a:rPr lang="en-US" dirty="0"/>
-              <a:t>Módulo 4</a:t>
+              <a:t> 5</a:t>
             </a:r>
           </a:p>
         </p:txBody>
@@ -3955,8 +3957,8 @@
           <a:lstStyle/>
           <a:p>
             <a:r>
-              <a:rPr lang="es-EC"/>
-              <a:t>¿Qué son?</a:t>
+              <a:rPr lang="es-EC" dirty="0"/>
+              <a:t>¿Cómo crear Hooks?</a:t>
             </a:r>
           </a:p>
         </p:txBody>
@@ -3984,37 +3986,8 @@
           <a:p>
             <a:r>
               <a:rPr lang="es-EC" dirty="0"/>
-              <a:t>Son funciones que permiten conectar o “enganchar” características de </a:t>
-            </a:r>
-            <a:r>
-              <a:rPr lang="es-EC" dirty="0" err="1"/>
-              <a:t>Class</a:t>
-            </a:r>
-            <a:r>
-              <a:rPr lang="es-EC" dirty="0"/>
-              <a:t> </a:t>
-            </a:r>
-            <a:r>
-              <a:rPr lang="es-EC" dirty="0" err="1"/>
-              <a:t>components</a:t>
-            </a:r>
-            <a:r>
-              <a:rPr lang="es-EC" dirty="0"/>
-              <a:t> en </a:t>
-            </a:r>
-            <a:r>
-              <a:rPr lang="es-EC" dirty="0" err="1"/>
-              <a:t>Functional</a:t>
-            </a:r>
-            <a:r>
-              <a:rPr lang="es-EC" dirty="0"/>
-              <a:t> </a:t>
-            </a:r>
-            <a:r>
-              <a:rPr lang="es-EC" dirty="0" err="1"/>
-              <a:t>components</a:t>
-            </a:r>
-            <a:endParaRPr lang="es-EC" dirty="0"/>
+              <a:t>Los Hooks estan hechos de Hooks</a:t>
+            </a:r>
           </a:p>
         </p:txBody>
       </p:sp>
@@ -4034,17 +4007,15 @@
 <file path=ppt/slides/slide3.xml><?xml version="1.0" encoding="utf-8"?>
 <p:sld xmlns:a="http://schemas.openxmlformats.org/drawingml/2006/main" xmlns:r="http://schemas.openxmlformats.org/officeDocument/2006/relationships" xmlns:p="http://schemas.openxmlformats.org/presentationml/2006/main">
   <p:cSld>
-    <p:bg>
-      <p:bgPr>
-        <a:solidFill>
-          <a:schemeClr val="bg1"/>
-        </a:solidFill>
-        <a:effectLst/>
-      </p:bgPr>
-    </p:bg>
     <p:spTree>
       <p:nvGrpSpPr>
-        <p:cNvPr id="1" name=""/>
+        <p:cNvPr id="1" name="">
+          <a:extLst>
+            <a:ext uri="{FF2B5EF4-FFF2-40B4-BE49-F238E27FC236}">
+              <a16:creationId xmlns:a16="http://schemas.microsoft.com/office/drawing/2014/main" id="{C88857D6-5016-F32C-D83A-57C9F67D2E32}"/>
+            </a:ext>
+          </a:extLst>
+        </p:cNvPr>
         <p:cNvGrpSpPr/>
         <p:nvPr/>
       </p:nvGrpSpPr>
@@ -4056,70 +4027,38 @@
           <a:chExt cx="0" cy="0"/>
         </a:xfrm>
       </p:grpSpPr>
-      <p:pic>
-        <p:nvPicPr>
-          <p:cNvPr id="5" name="Picture 4">
-            <a:extLst>
-              <a:ext uri="{FF2B5EF4-FFF2-40B4-BE49-F238E27FC236}">
-                <a16:creationId xmlns:a16="http://schemas.microsoft.com/office/drawing/2014/main" id="{AC4303FC-0EBD-B20A-A4D7-50AA43795438}"/>
-              </a:ext>
-            </a:extLst>
-          </p:cNvPr>
-          <p:cNvPicPr>
-            <a:picLocks noChangeAspect="1"/>
-          </p:cNvPicPr>
-          <p:nvPr/>
-        </p:nvPicPr>
-        <p:blipFill>
-          <a:blip r:embed="rId2"/>
-          <a:stretch>
-            <a:fillRect/>
-          </a:stretch>
-        </p:blipFill>
-        <p:spPr>
-          <a:xfrm>
-            <a:off x="6374511" y="0"/>
-            <a:ext cx="4987290" cy="6852666"/>
-          </a:xfrm>
-          <a:prstGeom prst="rect">
-            <a:avLst/>
-          </a:prstGeom>
-        </p:spPr>
-      </p:pic>
-      <p:pic>
-        <p:nvPicPr>
-          <p:cNvPr id="7" name="Picture 6">
-            <a:extLst>
-              <a:ext uri="{FF2B5EF4-FFF2-40B4-BE49-F238E27FC236}">
-                <a16:creationId xmlns:a16="http://schemas.microsoft.com/office/drawing/2014/main" id="{380A1195-69BC-BBEF-10AA-06DE08BD4D33}"/>
-              </a:ext>
-            </a:extLst>
-          </p:cNvPr>
-          <p:cNvPicPr>
-            <a:picLocks noChangeAspect="1"/>
-          </p:cNvPicPr>
-          <p:nvPr/>
-        </p:nvPicPr>
-        <p:blipFill>
-          <a:blip r:embed="rId3"/>
-          <a:stretch>
-            <a:fillRect/>
-          </a:stretch>
-        </p:blipFill>
-        <p:spPr>
-          <a:xfrm>
-            <a:off x="830199" y="0"/>
-            <a:ext cx="5265801" cy="6729603"/>
-          </a:xfrm>
-          <a:prstGeom prst="rect">
-            <a:avLst/>
-          </a:prstGeom>
-        </p:spPr>
-      </p:pic>
+      <p:sp>
+        <p:nvSpPr>
+          <p:cNvPr id="2" name="Title 1">
+            <a:extLst>
+              <a:ext uri="{FF2B5EF4-FFF2-40B4-BE49-F238E27FC236}">
+                <a16:creationId xmlns:a16="http://schemas.microsoft.com/office/drawing/2014/main" id="{CDE5393B-3525-5E62-D5B6-ED252BE813B1}"/>
+              </a:ext>
+            </a:extLst>
+          </p:cNvPr>
+          <p:cNvSpPr>
+            <a:spLocks noGrp="1"/>
+          </p:cNvSpPr>
+          <p:nvPr>
+            <p:ph type="title"/>
+          </p:nvPr>
+        </p:nvSpPr>
+        <p:spPr/>
+        <p:txBody>
+          <a:bodyPr/>
+          <a:lstStyle/>
+          <a:p>
+            <a:r>
+              <a:rPr lang="es-EC" dirty="0"/>
+              <a:t>Convenciones de Hooks</a:t>
+            </a:r>
+          </a:p>
+        </p:txBody>
+      </p:sp>
     </p:spTree>
     <p:extLst>
       <p:ext uri="{BB962C8B-B14F-4D97-AF65-F5344CB8AC3E}">
-        <p14:creationId xmlns:p14="http://schemas.microsoft.com/office/powerpoint/2010/main" val="2343739559"/>
+        <p14:creationId xmlns:p14="http://schemas.microsoft.com/office/powerpoint/2010/main" val="526049223"/>
       </p:ext>
     </p:extLst>
   </p:cSld>
@@ -4130,104 +4069,6 @@
 </file>
 
 <file path=ppt/slides/slide4.xml><?xml version="1.0" encoding="utf-8"?>
-<p:sld xmlns:a="http://schemas.openxmlformats.org/drawingml/2006/main" xmlns:r="http://schemas.openxmlformats.org/officeDocument/2006/relationships" xmlns:p="http://schemas.openxmlformats.org/presentationml/2006/main">
-  <p:cSld>
-    <p:bg>
-      <p:bgPr>
-        <a:solidFill>
-          <a:schemeClr val="bg1"/>
-        </a:solidFill>
-        <a:effectLst/>
-      </p:bgPr>
-    </p:bg>
-    <p:spTree>
-      <p:nvGrpSpPr>
-        <p:cNvPr id="1" name=""/>
-        <p:cNvGrpSpPr/>
-        <p:nvPr/>
-      </p:nvGrpSpPr>
-      <p:grpSpPr>
-        <a:xfrm>
-          <a:off x="0" y="0"/>
-          <a:ext cx="0" cy="0"/>
-          <a:chOff x="0" y="0"/>
-          <a:chExt cx="0" cy="0"/>
-        </a:xfrm>
-      </p:grpSpPr>
-      <p:pic>
-        <p:nvPicPr>
-          <p:cNvPr id="3" name="Picture 2">
-            <a:extLst>
-              <a:ext uri="{FF2B5EF4-FFF2-40B4-BE49-F238E27FC236}">
-                <a16:creationId xmlns:a16="http://schemas.microsoft.com/office/drawing/2014/main" id="{64447DBE-7D3C-1050-25CA-E037558093ED}"/>
-              </a:ext>
-            </a:extLst>
-          </p:cNvPr>
-          <p:cNvPicPr>
-            <a:picLocks noChangeAspect="1"/>
-          </p:cNvPicPr>
-          <p:nvPr/>
-        </p:nvPicPr>
-        <p:blipFill>
-          <a:blip r:embed="rId2"/>
-          <a:stretch>
-            <a:fillRect/>
-          </a:stretch>
-        </p:blipFill>
-        <p:spPr>
-          <a:xfrm>
-            <a:off x="710619" y="298542"/>
-            <a:ext cx="4836432" cy="6122067"/>
-          </a:xfrm>
-          <a:prstGeom prst="rect">
-            <a:avLst/>
-          </a:prstGeom>
-        </p:spPr>
-      </p:pic>
-      <p:pic>
-        <p:nvPicPr>
-          <p:cNvPr id="5" name="Picture 4">
-            <a:extLst>
-              <a:ext uri="{FF2B5EF4-FFF2-40B4-BE49-F238E27FC236}">
-                <a16:creationId xmlns:a16="http://schemas.microsoft.com/office/drawing/2014/main" id="{06A0F514-E98E-557C-F4CC-4DB21A4F3528}"/>
-              </a:ext>
-            </a:extLst>
-          </p:cNvPr>
-          <p:cNvPicPr>
-            <a:picLocks noChangeAspect="1"/>
-          </p:cNvPicPr>
-          <p:nvPr/>
-        </p:nvPicPr>
-        <p:blipFill>
-          <a:blip r:embed="rId3"/>
-          <a:stretch>
-            <a:fillRect/>
-          </a:stretch>
-        </p:blipFill>
-        <p:spPr>
-          <a:xfrm>
-            <a:off x="5878755" y="1139330"/>
-            <a:ext cx="5815035" cy="4579339"/>
-          </a:xfrm>
-          <a:prstGeom prst="rect">
-            <a:avLst/>
-          </a:prstGeom>
-        </p:spPr>
-      </p:pic>
-    </p:spTree>
-    <p:extLst>
-      <p:ext uri="{BB962C8B-B14F-4D97-AF65-F5344CB8AC3E}">
-        <p14:creationId xmlns:p14="http://schemas.microsoft.com/office/powerpoint/2010/main" val="637466271"/>
-      </p:ext>
-    </p:extLst>
-  </p:cSld>
-  <p:clrMapOvr>
-    <a:masterClrMapping/>
-  </p:clrMapOvr>
-</p:sld>
-</file>
-
-<file path=ppt/slides/slide5.xml><?xml version="1.0" encoding="utf-8"?>
 <p:sld xmlns:a="http://schemas.openxmlformats.org/drawingml/2006/main" xmlns:r="http://schemas.openxmlformats.org/officeDocument/2006/relationships" xmlns:p="http://schemas.openxmlformats.org/presentationml/2006/main">
   <p:cSld>
     <p:spTree>
@@ -4249,7 +4090,7 @@
           <p:cNvPr id="2" name="Title 1">
             <a:extLst>
               <a:ext uri="{FF2B5EF4-FFF2-40B4-BE49-F238E27FC236}">
-                <a16:creationId xmlns:a16="http://schemas.microsoft.com/office/drawing/2014/main" id="{D26F2126-3FD5-5E68-567B-A3C29613AC39}"/>
+                <a16:creationId xmlns:a16="http://schemas.microsoft.com/office/drawing/2014/main" id="{685F25A2-C7EE-F1EC-8EC5-55735FAB9491}"/>
               </a:ext>
             </a:extLst>
           </p:cNvPr>
@@ -4267,102 +4108,56 @@
           <a:p>
             <a:r>
               <a:rPr lang="es-ES_tradnl" dirty="0"/>
-              <a:t>Usando </a:t>
-            </a:r>
+              <a:t>Creando un Hook</a:t>
+            </a:r>
+          </a:p>
+        </p:txBody>
+      </p:sp>
+      <p:sp>
+        <p:nvSpPr>
+          <p:cNvPr id="3" name="Content Placeholder 2">
+            <a:extLst>
+              <a:ext uri="{FF2B5EF4-FFF2-40B4-BE49-F238E27FC236}">
+                <a16:creationId xmlns:a16="http://schemas.microsoft.com/office/drawing/2014/main" id="{400BF2BE-2029-6078-F3E4-65163F4BADE9}"/>
+              </a:ext>
+            </a:extLst>
+          </p:cNvPr>
+          <p:cNvSpPr>
+            <a:spLocks noGrp="1"/>
+          </p:cNvSpPr>
+          <p:nvPr>
+            <p:ph idx="1"/>
+          </p:nvPr>
+        </p:nvSpPr>
+        <p:spPr/>
+        <p:txBody>
+          <a:bodyPr/>
+          <a:lstStyle/>
+          <a:p>
             <a:r>
               <a:rPr lang="es-ES_tradnl" dirty="0" err="1"/>
-              <a:t>Hooks</a:t>
+              <a:t>usePagination</a:t>
             </a:r>
             <a:endParaRPr lang="es-ES_tradnl" dirty="0"/>
           </a:p>
-        </p:txBody>
-      </p:sp>
-      <p:sp>
-        <p:nvSpPr>
-          <p:cNvPr id="3" name="Content Placeholder 2">
-            <a:extLst>
-              <a:ext uri="{FF2B5EF4-FFF2-40B4-BE49-F238E27FC236}">
-                <a16:creationId xmlns:a16="http://schemas.microsoft.com/office/drawing/2014/main" id="{B320F7D5-B5C3-D533-424A-F7CA08C4284C}"/>
-              </a:ext>
-            </a:extLst>
-          </p:cNvPr>
-          <p:cNvSpPr>
-            <a:spLocks noGrp="1"/>
-          </p:cNvSpPr>
-          <p:nvPr>
-            <p:ph idx="1"/>
-          </p:nvPr>
-        </p:nvSpPr>
-        <p:spPr/>
-        <p:txBody>
-          <a:bodyPr/>
-          <a:lstStyle/>
           <a:p>
             <a:r>
               <a:rPr lang="es-ES_tradnl" dirty="0"/>
-              <a:t>Crear un nuevo URL “</a:t>
+              <a:t>Debe recibir un Array y el número de ítems por pagina</a:t>
+            </a:r>
+          </a:p>
+          <a:p>
+            <a:r>
+              <a:rPr lang="es-ES_tradnl" dirty="0"/>
+              <a:t>Devuelve: función para ir a la siguiente página, atrás, array de los </a:t>
             </a:r>
             <a:r>
               <a:rPr lang="es-ES_tradnl" dirty="0" err="1"/>
-              <a:t>users</a:t>
+              <a:t>item</a:t>
             </a:r>
             <a:r>
               <a:rPr lang="es-ES_tradnl" dirty="0"/>
-              <a:t>/</a:t>
-            </a:r>
-            <a:r>
-              <a:rPr lang="es-ES_tradnl" dirty="0" err="1"/>
-              <a:t>form</a:t>
-            </a:r>
-            <a:r>
-              <a:rPr lang="es-ES_tradnl" dirty="0"/>
-              <a:t>/:</a:t>
-            </a:r>
-            <a:r>
-              <a:rPr lang="es-ES_tradnl"/>
-              <a:t>index?” </a:t>
-            </a:r>
-            <a:r>
-              <a:rPr lang="es-ES_tradnl" dirty="0"/>
-              <a:t>para una vista de formulario.</a:t>
-            </a:r>
-          </a:p>
-          <a:p>
-            <a:r>
-              <a:rPr lang="es-ES_tradnl" dirty="0"/>
-              <a:t>Crear un formulario para </a:t>
-            </a:r>
-            <a:r>
-              <a:rPr lang="es-ES_tradnl" dirty="0" err="1"/>
-              <a:t>name</a:t>
-            </a:r>
-            <a:r>
-              <a:rPr lang="es-ES_tradnl" dirty="0"/>
-              <a:t>, </a:t>
-            </a:r>
-            <a:r>
-              <a:rPr lang="es-ES_tradnl" dirty="0" err="1"/>
-              <a:t>age</a:t>
-            </a:r>
-            <a:r>
-              <a:rPr lang="es-ES_tradnl" dirty="0"/>
-              <a:t>, </a:t>
-            </a:r>
-            <a:r>
-              <a:rPr lang="es-ES_tradnl" dirty="0" err="1"/>
-              <a:t>city</a:t>
-            </a:r>
-            <a:r>
-              <a:rPr lang="es-ES_tradnl" dirty="0"/>
-              <a:t> y </a:t>
-            </a:r>
-            <a:r>
-              <a:rPr lang="es-ES_tradnl" dirty="0" err="1"/>
-              <a:t>verified</a:t>
-            </a:r>
-            <a:r>
-              <a:rPr lang="es-ES_tradnl" dirty="0"/>
-              <a:t>.</a:t>
+              <a:t> de la página y total de páginas.</a:t>
             </a:r>
           </a:p>
         </p:txBody>
@@ -4370,134 +4165,7 @@
     </p:spTree>
     <p:extLst>
       <p:ext uri="{BB962C8B-B14F-4D97-AF65-F5344CB8AC3E}">
-        <p14:creationId xmlns:p14="http://schemas.microsoft.com/office/powerpoint/2010/main" val="2414382881"/>
-      </p:ext>
-    </p:extLst>
-  </p:cSld>
-  <p:clrMapOvr>
-    <a:masterClrMapping/>
-  </p:clrMapOvr>
-</p:sld>
-</file>
-
-<file path=ppt/slides/slide6.xml><?xml version="1.0" encoding="utf-8"?>
-<p:sld xmlns:a="http://schemas.openxmlformats.org/drawingml/2006/main" xmlns:r="http://schemas.openxmlformats.org/officeDocument/2006/relationships" xmlns:p="http://schemas.openxmlformats.org/presentationml/2006/main">
-  <p:cSld>
-    <p:spTree>
-      <p:nvGrpSpPr>
-        <p:cNvPr id="1" name=""/>
-        <p:cNvGrpSpPr/>
-        <p:nvPr/>
-      </p:nvGrpSpPr>
-      <p:grpSpPr>
-        <a:xfrm>
-          <a:off x="0" y="0"/>
-          <a:ext cx="0" cy="0"/>
-          <a:chOff x="0" y="0"/>
-          <a:chExt cx="0" cy="0"/>
-        </a:xfrm>
-      </p:grpSpPr>
-      <p:sp>
-        <p:nvSpPr>
-          <p:cNvPr id="2" name="Title 1">
-            <a:extLst>
-              <a:ext uri="{FF2B5EF4-FFF2-40B4-BE49-F238E27FC236}">
-                <a16:creationId xmlns:a16="http://schemas.microsoft.com/office/drawing/2014/main" id="{28B9AE6B-316A-D4DD-7AF2-35DEC011C93B}"/>
-              </a:ext>
-            </a:extLst>
-          </p:cNvPr>
-          <p:cNvSpPr>
-            <a:spLocks noGrp="1"/>
-          </p:cNvSpPr>
-          <p:nvPr>
-            <p:ph type="title"/>
-          </p:nvPr>
-        </p:nvSpPr>
-        <p:spPr/>
-        <p:txBody>
-          <a:bodyPr/>
-          <a:lstStyle/>
-          <a:p>
-            <a:r>
-              <a:rPr lang="es-ES_tradnl" dirty="0"/>
-              <a:t>Práctica</a:t>
-            </a:r>
-          </a:p>
-        </p:txBody>
-      </p:sp>
-      <p:sp>
-        <p:nvSpPr>
-          <p:cNvPr id="3" name="Content Placeholder 2">
-            <a:extLst>
-              <a:ext uri="{FF2B5EF4-FFF2-40B4-BE49-F238E27FC236}">
-                <a16:creationId xmlns:a16="http://schemas.microsoft.com/office/drawing/2014/main" id="{D78E4910-BF98-6609-8268-8E32F0E4C00D}"/>
-              </a:ext>
-            </a:extLst>
-          </p:cNvPr>
-          <p:cNvSpPr>
-            <a:spLocks noGrp="1"/>
-          </p:cNvSpPr>
-          <p:nvPr>
-            <p:ph idx="1"/>
-          </p:nvPr>
-        </p:nvSpPr>
-        <p:spPr/>
-        <p:txBody>
-          <a:bodyPr/>
-          <a:lstStyle/>
-          <a:p>
-            <a:pPr marL="0" indent="0">
-              <a:buNone/>
-            </a:pPr>
-            <a:r>
-              <a:rPr lang="es-ES_tradnl" dirty="0"/>
-              <a:t>Crear un botón en el componente “</a:t>
-            </a:r>
-            <a:r>
-              <a:rPr lang="es-ES_tradnl" dirty="0" err="1"/>
-              <a:t>UserProfile</a:t>
-            </a:r>
-            <a:r>
-              <a:rPr lang="es-ES_tradnl" dirty="0"/>
-              <a:t>” que se llame “Eliminar” de color rojo. Este deberá invocar una nueva función en nuestro </a:t>
-            </a:r>
-            <a:r>
-              <a:rPr lang="es-ES_tradnl" dirty="0" err="1"/>
-              <a:t>DataSource</a:t>
-            </a:r>
-            <a:r>
-              <a:rPr lang="es-ES_tradnl" dirty="0"/>
-              <a:t> “</a:t>
-            </a:r>
-            <a:r>
-              <a:rPr lang="es-ES_tradnl" dirty="0" err="1"/>
-              <a:t>deleteUser</a:t>
-            </a:r>
-            <a:r>
-              <a:rPr lang="es-ES_tradnl" dirty="0"/>
-              <a:t>” que recibe el </a:t>
-            </a:r>
-            <a:r>
-              <a:rPr lang="es-ES_tradnl" dirty="0" err="1"/>
-              <a:t>index</a:t>
-            </a:r>
-            <a:r>
-              <a:rPr lang="es-ES_tradnl" dirty="0"/>
-              <a:t> del usuario y lo elimina de la base de datos.</a:t>
-            </a:r>
-          </a:p>
-          <a:p>
-            <a:pPr marL="0" indent="0">
-              <a:buNone/>
-            </a:pPr>
-            <a:endParaRPr lang="es-ES_tradnl" dirty="0"/>
-          </a:p>
-        </p:txBody>
-      </p:sp>
-    </p:spTree>
-    <p:extLst>
-      <p:ext uri="{BB962C8B-B14F-4D97-AF65-F5344CB8AC3E}">
-        <p14:creationId xmlns:p14="http://schemas.microsoft.com/office/powerpoint/2010/main" val="940038753"/>
+        <p14:creationId xmlns:p14="http://schemas.microsoft.com/office/powerpoint/2010/main" val="3587075460"/>
       </p:ext>
     </p:extLst>
   </p:cSld>
@@ -5147,6 +4815,14 @@
 </file>
 
 <file path=customXml/item2.xml><?xml version="1.0" encoding="utf-8"?>
+<p:properties xmlns:p="http://schemas.microsoft.com/office/2006/metadata/properties" xmlns:xsi="http://www.w3.org/2001/XMLSchema-instance" xmlns:pc="http://schemas.microsoft.com/office/infopath/2007/PartnerControls">
+  <documentManagement>
+    <_activity xmlns="98b3f1ad-107c-497c-bb15-64aaebc89f52" xsi:nil="true"/>
+  </documentManagement>
+</p:properties>
+</file>
+
+<file path=customXml/item3.xml><?xml version="1.0" encoding="utf-8"?>
 <ct:contentTypeSchema xmlns:ct="http://schemas.microsoft.com/office/2006/metadata/contentType" xmlns:ma="http://schemas.microsoft.com/office/2006/metadata/properties/metaAttributes" ct:_="" ma:_="" ma:contentTypeName="Documento" ma:contentTypeID="0x0101000ABC46EDA268834388609BD5B286F917" ma:contentTypeVersion="17" ma:contentTypeDescription="Crear nuevo documento." ma:contentTypeScope="" ma:versionID="b8ef759d716670bba47381dcbb7cab08">
   <xsd:schema xmlns:xsd="http://www.w3.org/2001/XMLSchema" xmlns:xs="http://www.w3.org/2001/XMLSchema" xmlns:p="http://schemas.microsoft.com/office/2006/metadata/properties" xmlns:ns3="98b3f1ad-107c-497c-bb15-64aaebc89f52" xmlns:ns4="a0690ee9-4047-4223-84b2-6b02f926f5d8" targetNamespace="http://schemas.microsoft.com/office/2006/metadata/properties" ma:root="true" ma:fieldsID="f0548e293e02a81e2d97140f47270d75" ns3:_="" ns4:_="">
     <xsd:import namespace="98b3f1ad-107c-497c-bb15-64aaebc89f52"/>
@@ -5393,14 +5069,6 @@
 </ct:contentTypeSchema>
 </file>
 
-<file path=customXml/item3.xml><?xml version="1.0" encoding="utf-8"?>
-<p:properties xmlns:p="http://schemas.microsoft.com/office/2006/metadata/properties" xmlns:xsi="http://www.w3.org/2001/XMLSchema-instance" xmlns:pc="http://schemas.microsoft.com/office/infopath/2007/PartnerControls">
-  <documentManagement>
-    <_activity xmlns="98b3f1ad-107c-497c-bb15-64aaebc89f52" xsi:nil="true"/>
-  </documentManagement>
-</p:properties>
-</file>
-
 <file path=customXml/itemProps1.xml><?xml version="1.0" encoding="utf-8"?>
 <ds:datastoreItem xmlns:ds="http://schemas.openxmlformats.org/officeDocument/2006/customXml" ds:itemID="{F5C501D5-0101-419A-AFBB-D8F04111C142}">
   <ds:schemaRefs>
@@ -5410,6 +5078,23 @@
 </file>
 
 <file path=customXml/itemProps2.xml><?xml version="1.0" encoding="utf-8"?>
+<ds:datastoreItem xmlns:ds="http://schemas.openxmlformats.org/officeDocument/2006/customXml" ds:itemID="{EEC6291A-1BB8-4D31-80EF-6AAECF11ECF7}">
+  <ds:schemaRefs>
+    <ds:schemaRef ds:uri="a0690ee9-4047-4223-84b2-6b02f926f5d8"/>
+    <ds:schemaRef ds:uri="http://www.w3.org/XML/1998/namespace"/>
+    <ds:schemaRef ds:uri="http://schemas.microsoft.com/office/2006/metadata/properties"/>
+    <ds:schemaRef ds:uri="http://schemas.microsoft.com/office/2006/documentManagement/types"/>
+    <ds:schemaRef ds:uri="98b3f1ad-107c-497c-bb15-64aaebc89f52"/>
+    <ds:schemaRef ds:uri="http://purl.org/dc/elements/1.1/"/>
+    <ds:schemaRef ds:uri="http://purl.org/dc/dcmitype/"/>
+    <ds:schemaRef ds:uri="http://purl.org/dc/terms/"/>
+    <ds:schemaRef ds:uri="http://schemas.microsoft.com/office/infopath/2007/PartnerControls"/>
+    <ds:schemaRef ds:uri="http://schemas.openxmlformats.org/package/2006/metadata/core-properties"/>
+  </ds:schemaRefs>
+</ds:datastoreItem>
+</file>
+
+<file path=customXml/itemProps3.xml><?xml version="1.0" encoding="utf-8"?>
 <ds:datastoreItem xmlns:ds="http://schemas.openxmlformats.org/officeDocument/2006/customXml" ds:itemID="{3FCEF456-3233-44D6-BC5A-12E8FD4D2764}">
   <ds:schemaRefs>
     <ds:schemaRef ds:uri="http://schemas.microsoft.com/office/2006/metadata/contentType"/>
@@ -5426,21 +5111,4 @@
     <ds:schemaRef ds:uri="http://schemas.microsoft.com/internal/obd"/>
   </ds:schemaRefs>
 </ds:datastoreItem>
-</file>
-
-<file path=customXml/itemProps3.xml><?xml version="1.0" encoding="utf-8"?>
-<ds:datastoreItem xmlns:ds="http://schemas.openxmlformats.org/officeDocument/2006/customXml" ds:itemID="{EEC6291A-1BB8-4D31-80EF-6AAECF11ECF7}">
-  <ds:schemaRefs>
-    <ds:schemaRef ds:uri="a0690ee9-4047-4223-84b2-6b02f926f5d8"/>
-    <ds:schemaRef ds:uri="http://www.w3.org/XML/1998/namespace"/>
-    <ds:schemaRef ds:uri="http://schemas.microsoft.com/office/2006/metadata/properties"/>
-    <ds:schemaRef ds:uri="http://schemas.microsoft.com/office/2006/documentManagement/types"/>
-    <ds:schemaRef ds:uri="98b3f1ad-107c-497c-bb15-64aaebc89f52"/>
-    <ds:schemaRef ds:uri="http://purl.org/dc/elements/1.1/"/>
-    <ds:schemaRef ds:uri="http://purl.org/dc/dcmitype/"/>
-    <ds:schemaRef ds:uri="http://purl.org/dc/terms/"/>
-    <ds:schemaRef ds:uri="http://schemas.microsoft.com/office/infopath/2007/PartnerControls"/>
-    <ds:schemaRef ds:uri="http://schemas.openxmlformats.org/package/2006/metadata/core-properties"/>
-  </ds:schemaRefs>
-</ds:datastoreItem>
 </file>
</xml_diff>